<commit_message>
Fixed TeX base for my slides; changed working on slide [3]
</commit_message>
<xml_diff>
--- a/doc/slides/main.pptx
+++ b/doc/slides/main.pptx
@@ -5847,13 +5847,22 @@
               <a:buChar char="•"/>
             </a:pPr>
             <a:r>
+              <a:rPr lang="en-US" sz="3200" b="1">
+                <a:solidFill>
+                  <a:srgbClr val="604C37"/>
+                </a:solidFill>
+                <a:latin typeface="Helvetica Rounded" pitchFamily="2" charset="77"/>
+              </a:rPr>
+              <a:t>we continue as </a:t>
+            </a:r>
+            <a:r>
               <a:rPr lang="en-US" sz="3200" b="1" dirty="0">
                 <a:solidFill>
                   <a:srgbClr val="604C37"/>
                 </a:solidFill>
                 <a:latin typeface="Helvetica Rounded" pitchFamily="2" charset="77"/>
               </a:rPr>
-              <a:t>we’ve got two processes living in parallel.</a:t>
+              <a:t>two processes living in parallel.</a:t>
             </a:r>
           </a:p>
         </p:txBody>

</xml_diff>

<commit_message>
Fixed size & position of slides; added visual rest
</commit_message>
<xml_diff>
--- a/doc/slides/main.pptx
+++ b/doc/slides/main.pptx
@@ -507,7 +507,214 @@
           <a:p>
             <a:r>
               <a:rPr lang="en-US" dirty="0"/>
-              <a:t>[7] So in essence, what I’m doing when I write an email is, I’m forking off a process which represents the data of the email, and then I’m giving my supervisor access to it...</a:t>
+              <a:t>Talking about ”Taking Linear Logic Apart”... </a:t>
+            </a:r>
+          </a:p>
+          <a:p>
+            <a:r>
+              <a:rPr lang="en-US" dirty="0"/>
+              <a:t>We’ll see what that means in a second.</a:t>
+            </a:r>
+          </a:p>
+          <a:p>
+            <a:r>
+              <a:rPr lang="en-US" dirty="0"/>
+              <a:t>Joint work with Fabrizio </a:t>
+            </a:r>
+            <a:r>
+              <a:rPr lang="en-US" dirty="0" err="1"/>
+              <a:t>Montesi</a:t>
+            </a:r>
+            <a:r>
+              <a:rPr lang="en-US" dirty="0"/>
+              <a:t> and Marco </a:t>
+            </a:r>
+            <a:r>
+              <a:rPr lang="en-US" dirty="0" err="1"/>
+              <a:t>Peressotti</a:t>
+            </a:r>
+            <a:r>
+              <a:rPr lang="en-US" dirty="0"/>
+              <a:t>, who couldn’t be here today, because they live in Denmark.</a:t>
+            </a:r>
+          </a:p>
+        </p:txBody>
+      </p:sp>
+      <p:sp>
+        <p:nvSpPr>
+          <p:cNvPr id="4" name="Slide Number Placeholder 3"/>
+          <p:cNvSpPr>
+            <a:spLocks noGrp="1"/>
+          </p:cNvSpPr>
+          <p:nvPr>
+            <p:ph type="sldNum" sz="quarter" idx="10"/>
+          </p:nvPr>
+        </p:nvSpPr>
+        <p:spPr/>
+        <p:txBody>
+          <a:bodyPr/>
+          <a:lstStyle/>
+          <a:p>
+            <a:fld id="{DFE3F239-427C-A149-8C48-8C46C7B53C32}" type="slidenum">
+              <a:rPr lang="en-US" smtClean="0"/>
+              <a:t>1</a:t>
+            </a:fld>
+            <a:endParaRPr lang="en-US"/>
+          </a:p>
+        </p:txBody>
+      </p:sp>
+    </p:spTree>
+    <p:extLst>
+      <p:ext uri="{BB962C8B-B14F-4D97-AF65-F5344CB8AC3E}">
+        <p14:creationId xmlns:p14="http://schemas.microsoft.com/office/powerpoint/2010/main" val="548659669"/>
+      </p:ext>
+    </p:extLst>
+  </p:cSld>
+  <p:clrMapOvr>
+    <a:masterClrMapping/>
+  </p:clrMapOvr>
+</p:notes>
+</file>
+
+<file path=ppt/notesSlides/notesSlide2.xml><?xml version="1.0" encoding="utf-8"?>
+<p:notes xmlns:a="http://schemas.openxmlformats.org/drawingml/2006/main" xmlns:r="http://schemas.openxmlformats.org/officeDocument/2006/relationships" xmlns:p="http://schemas.openxmlformats.org/presentationml/2006/main">
+  <p:cSld>
+    <p:spTree>
+      <p:nvGrpSpPr>
+        <p:cNvPr id="1" name=""/>
+        <p:cNvGrpSpPr/>
+        <p:nvPr/>
+      </p:nvGrpSpPr>
+      <p:grpSpPr>
+        <a:xfrm>
+          <a:off x="0" y="0"/>
+          <a:ext cx="0" cy="0"/>
+          <a:chOff x="0" y="0"/>
+          <a:chExt cx="0" cy="0"/>
+        </a:xfrm>
+      </p:grpSpPr>
+      <p:sp>
+        <p:nvSpPr>
+          <p:cNvPr id="2" name="Slide Image Placeholder 1"/>
+          <p:cNvSpPr>
+            <a:spLocks noGrp="1" noRot="1" noChangeAspect="1"/>
+          </p:cNvSpPr>
+          <p:nvPr>
+            <p:ph type="sldImg"/>
+          </p:nvPr>
+        </p:nvSpPr>
+        <p:spPr/>
+      </p:sp>
+      <p:sp>
+        <p:nvSpPr>
+          <p:cNvPr id="3" name="Notes Placeholder 2"/>
+          <p:cNvSpPr>
+            <a:spLocks noGrp="1"/>
+          </p:cNvSpPr>
+          <p:nvPr>
+            <p:ph type="body" idx="1"/>
+          </p:nvPr>
+        </p:nvSpPr>
+        <p:spPr/>
+        <p:txBody>
+          <a:bodyPr/>
+          <a:lstStyle/>
+          <a:p>
+            <a:pPr marL="228600" indent="-228600">
+              <a:buFont typeface="+mj-lt"/>
+              <a:buAutoNum type="arabicPeriod"/>
+            </a:pPr>
+            <a:r>
+              <a:rPr lang="en-US" dirty="0"/>
+              <a:t>So... Like all good presentations, let’s start with an example... In this case, me, sending an email, to my supervisor!</a:t>
+            </a:r>
+          </a:p>
+          <a:p>
+            <a:pPr marL="228600" indent="-228600">
+              <a:buFont typeface="+mj-lt"/>
+              <a:buAutoNum type="arabicPeriod"/>
+            </a:pPr>
+            <a:r>
+              <a:rPr lang="en-US" dirty="0"/>
+              <a:t>That’s me!</a:t>
+            </a:r>
+          </a:p>
+          <a:p>
+            <a:pPr marL="228600" indent="-228600">
+              <a:buFont typeface="+mj-lt"/>
+              <a:buAutoNum type="arabicPeriod"/>
+            </a:pPr>
+            <a:r>
+              <a:rPr lang="en-US" dirty="0"/>
+              <a:t>And that’s my supervisor...</a:t>
+            </a:r>
+          </a:p>
+          <a:p>
+            <a:pPr marL="228600" indent="-228600">
+              <a:buFont typeface="+mj-lt"/>
+              <a:buAutoNum type="arabicPeriod"/>
+            </a:pPr>
+            <a:r>
+              <a:rPr lang="en-US" dirty="0"/>
+              <a:t>That’s the email I wrote...</a:t>
+            </a:r>
+          </a:p>
+          <a:p>
+            <a:pPr marL="228600" indent="-228600">
+              <a:buFont typeface="+mj-lt"/>
+              <a:buAutoNum type="arabicPeriod"/>
+            </a:pPr>
+            <a:r>
+              <a:rPr lang="en-US" dirty="0"/>
+              <a:t>And that’s me, continuing to do some work after I send the email...</a:t>
+            </a:r>
+          </a:p>
+          <a:p>
+            <a:pPr marL="228600" indent="-228600">
+              <a:buFont typeface="+mj-lt"/>
+              <a:buAutoNum type="arabicPeriod"/>
+            </a:pPr>
+            <a:r>
+              <a:rPr lang="en-US" dirty="0"/>
+              <a:t>Or going climbing...</a:t>
+            </a:r>
+          </a:p>
+          <a:p>
+            <a:pPr marL="228600" indent="-228600">
+              <a:buFont typeface="+mj-lt"/>
+              <a:buAutoNum type="arabicPeriod"/>
+            </a:pPr>
+            <a:r>
+              <a:rPr lang="en-US" dirty="0"/>
+              <a:t>Or doing whatever... The point is, we don’t really care about what I do </a:t>
+            </a:r>
+            <a:r>
+              <a:rPr lang="en-US" i="1" dirty="0"/>
+              <a:t>after</a:t>
+            </a:r>
+            <a:r>
+              <a:rPr lang="en-US" i="0" dirty="0"/>
+              <a:t> I send the email...</a:t>
+            </a:r>
+          </a:p>
+          <a:p>
+            <a:pPr marL="228600" indent="-228600">
+              <a:buFont typeface="+mj-lt"/>
+              <a:buAutoNum type="arabicPeriod"/>
+            </a:pPr>
+            <a:r>
+              <a:rPr lang="en-US" dirty="0"/>
+              <a:t>So that “y”, that’s a channel which gives you access to the email. In essence, what I’m doing when I write an email is, I’m forking off a process which represents the data of the email, and then I’m giving my supervisor access to it...</a:t>
+            </a:r>
+          </a:p>
+          <a:p>
+            <a:pPr marL="228600" indent="-228600">
+              <a:buFont typeface="+mj-lt"/>
+              <a:buAutoNum type="arabicPeriod"/>
+            </a:pPr>
+            <a:r>
+              <a:rPr lang="en-US" dirty="0"/>
+              <a:t>And that “x”, well, that’s for future communication with me....</a:t>
             </a:r>
           </a:p>
         </p:txBody>
@@ -3772,7 +3979,7 @@
       </p:grpSpPr>
       <p:pic>
         <p:nvPicPr>
-          <p:cNvPr id="4" name="Picture 3">
+          <p:cNvPr id="4" name="Slide title">
             <a:extLst>
               <a:ext uri="{FF2B5EF4-FFF2-40B4-BE49-F238E27FC236}">
                 <a16:creationId xmlns:a16="http://schemas.microsoft.com/office/drawing/2014/main" id="{648BCCDF-081B-7D43-AC91-73E6E6C5BB68}"/>
@@ -3785,7 +3992,7 @@
           <p:nvPr/>
         </p:nvPicPr>
         <p:blipFill>
-          <a:blip r:embed="rId2"/>
+          <a:blip r:embed="rId3"/>
           <a:stretch>
             <a:fillRect/>
           </a:stretch>
@@ -3793,7 +4000,7 @@
         <p:spPr>
           <a:xfrm>
             <a:off x="0" y="0"/>
-            <a:ext cx="12209928" cy="6858000"/>
+            <a:ext cx="12193200" cy="6858000"/>
           </a:xfrm>
           <a:prstGeom prst="rect">
             <a:avLst/>
@@ -3852,8 +4059,8 @@
         </p:blipFill>
         <p:spPr>
           <a:xfrm>
-            <a:off x="-17929" y="0"/>
-            <a:ext cx="12209929" cy="6858000"/>
+            <a:off x="0" y="0"/>
+            <a:ext cx="12193200" cy="6858000"/>
           </a:xfrm>
           <a:prstGeom prst="rect">
             <a:avLst/>
@@ -3883,7 +4090,7 @@
         <p:spPr>
           <a:xfrm>
             <a:off x="-1" y="0"/>
-            <a:ext cx="12209929" cy="6858000"/>
+            <a:ext cx="12193200" cy="6858000"/>
           </a:xfrm>
           <a:prstGeom prst="rect">
             <a:avLst/>
@@ -3913,7 +4120,7 @@
         <p:spPr>
           <a:xfrm>
             <a:off x="0" y="0"/>
-            <a:ext cx="12192000" cy="6847930"/>
+            <a:ext cx="12193200" cy="6858000"/>
           </a:xfrm>
           <a:prstGeom prst="rect">
             <a:avLst/>
@@ -5377,10 +5584,10 @@
       </p:grpSpPr>
       <p:pic>
         <p:nvPicPr>
-          <p:cNvPr id="2" name="Slide cut highlighted">
-            <a:extLst>
-              <a:ext uri="{FF2B5EF4-FFF2-40B4-BE49-F238E27FC236}">
-                <a16:creationId xmlns:a16="http://schemas.microsoft.com/office/drawing/2014/main" id="{DAA524E1-AFFA-594B-810D-0434E7CF923A}"/>
+          <p:cNvPr id="22" name="Slide whatever">
+            <a:extLst>
+              <a:ext uri="{FF2B5EF4-FFF2-40B4-BE49-F238E27FC236}">
+                <a16:creationId xmlns:a16="http://schemas.microsoft.com/office/drawing/2014/main" id="{D98D4005-93E3-804B-97F9-9628EB9B481A}"/>
               </a:ext>
             </a:extLst>
           </p:cNvPr>
@@ -5397,8 +5604,8 @@
         </p:blipFill>
         <p:spPr>
           <a:xfrm>
-            <a:off x="0" y="0"/>
-            <a:ext cx="12192000" cy="6847930"/>
+            <a:off x="-1" y="0"/>
+            <a:ext cx="12193200" cy="6858714"/>
           </a:xfrm>
           <a:prstGeom prst="rect">
             <a:avLst/>
@@ -5407,10 +5614,10 @@
       </p:pic>
       <p:pic>
         <p:nvPicPr>
-          <p:cNvPr id="20" name="Slide cut &amp; send highlighted">
-            <a:extLst>
-              <a:ext uri="{FF2B5EF4-FFF2-40B4-BE49-F238E27FC236}">
-                <a16:creationId xmlns:a16="http://schemas.microsoft.com/office/drawing/2014/main" id="{E6DC485E-EF58-AF4B-9165-DF632FC67980}"/>
+          <p:cNvPr id="2" name="Slide cut highlighted">
+            <a:extLst>
+              <a:ext uri="{FF2B5EF4-FFF2-40B4-BE49-F238E27FC236}">
+                <a16:creationId xmlns:a16="http://schemas.microsoft.com/office/drawing/2014/main" id="{DAA524E1-AFFA-594B-810D-0434E7CF923A}"/>
               </a:ext>
             </a:extLst>
           </p:cNvPr>
@@ -5427,8 +5634,38 @@
         </p:blipFill>
         <p:spPr>
           <a:xfrm>
-            <a:off x="-17930" y="-10071"/>
-            <a:ext cx="12209929" cy="6858001"/>
+            <a:off x="0" y="0"/>
+            <a:ext cx="12193200" cy="6858000"/>
+          </a:xfrm>
+          <a:prstGeom prst="rect">
+            <a:avLst/>
+          </a:prstGeom>
+        </p:spPr>
+      </p:pic>
+      <p:pic>
+        <p:nvPicPr>
+          <p:cNvPr id="20" name="Slide cut &amp; send highlighted">
+            <a:extLst>
+              <a:ext uri="{FF2B5EF4-FFF2-40B4-BE49-F238E27FC236}">
+                <a16:creationId xmlns:a16="http://schemas.microsoft.com/office/drawing/2014/main" id="{E6DC485E-EF58-AF4B-9165-DF632FC67980}"/>
+              </a:ext>
+            </a:extLst>
+          </p:cNvPr>
+          <p:cNvPicPr>
+            <a:picLocks noChangeAspect="1"/>
+          </p:cNvPicPr>
+          <p:nvPr/>
+        </p:nvPicPr>
+        <p:blipFill>
+          <a:blip r:embed="rId4"/>
+          <a:stretch>
+            <a:fillRect/>
+          </a:stretch>
+        </p:blipFill>
+        <p:spPr>
+          <a:xfrm>
+            <a:off x="0" y="0"/>
+            <a:ext cx="12193200" cy="6858001"/>
           </a:xfrm>
           <a:prstGeom prst="rect">
             <a:avLst/>
@@ -5847,22 +6084,13 @@
               <a:buChar char="•"/>
             </a:pPr>
             <a:r>
-              <a:rPr lang="en-US" sz="3200" b="1">
-                <a:solidFill>
-                  <a:srgbClr val="604C37"/>
-                </a:solidFill>
-                <a:latin typeface="Helvetica Rounded" pitchFamily="2" charset="77"/>
-              </a:rPr>
-              <a:t>we continue as </a:t>
-            </a:r>
-            <a:r>
               <a:rPr lang="en-US" sz="3200" b="1" dirty="0">
                 <a:solidFill>
                   <a:srgbClr val="604C37"/>
                 </a:solidFill>
                 <a:latin typeface="Helvetica Rounded" pitchFamily="2" charset="77"/>
               </a:rPr>
-              <a:t>two processes living in parallel.</a:t>
+              <a:t>we continue as two processes living in parallel.</a:t>
             </a:r>
           </a:p>
         </p:txBody>
@@ -6086,7 +6314,7 @@
                             </p:stCondLst>
                             <p:childTnLst>
                               <p:par>
-                                <p:cTn id="5" presetID="1" presetClass="entr" presetSubtype="0" fill="hold" grpId="0" nodeType="clickEffect">
+                                <p:cTn id="5" presetID="1" presetClass="entr" presetSubtype="0" fill="hold" nodeType="clickEffect">
                                   <p:stCondLst>
                                     <p:cond delay="0"/>
                                   </p:stCondLst>
@@ -6099,7 +6327,34 @@
                                           </p:stCondLst>
                                         </p:cTn>
                                         <p:tgtEl>
-                                          <p:spTgt spid="10"/>
+                                          <p:spTgt spid="2"/>
+                                        </p:tgtEl>
+                                        <p:attrNameLst>
+                                          <p:attrName>style.visibility</p:attrName>
+                                        </p:attrNameLst>
+                                      </p:cBhvr>
+                                      <p:to>
+                                        <p:strVal val="visible"/>
+                                      </p:to>
+                                    </p:set>
+                                  </p:childTnLst>
+                                </p:cTn>
+                              </p:par>
+                              <p:par>
+                                <p:cTn id="7" presetID="1" presetClass="entr" presetSubtype="0" fill="hold" grpId="1" nodeType="withEffect">
+                                  <p:stCondLst>
+                                    <p:cond delay="0"/>
+                                  </p:stCondLst>
+                                  <p:childTnLst>
+                                    <p:set>
+                                      <p:cBhvr>
+                                        <p:cTn id="8" dur="1" fill="hold">
+                                          <p:stCondLst>
+                                            <p:cond delay="0"/>
+                                          </p:stCondLst>
+                                        </p:cTn>
+                                        <p:tgtEl>
+                                          <p:spTgt spid="3"/>
                                         </p:tgtEl>
                                         <p:attrNameLst>
                                           <p:attrName>style.visibility</p:attrName>
@@ -6119,46 +6374,19 @@
                     </p:cTn>
                   </p:par>
                   <p:par>
-                    <p:cTn id="7" fill="hold">
+                    <p:cTn id="9" fill="hold">
                       <p:stCondLst>
                         <p:cond delay="indefinite"/>
                       </p:stCondLst>
                       <p:childTnLst>
                         <p:par>
-                          <p:cTn id="8" fill="hold">
+                          <p:cTn id="10" fill="hold">
                             <p:stCondLst>
                               <p:cond delay="0"/>
                             </p:stCondLst>
                             <p:childTnLst>
                               <p:par>
-                                <p:cTn id="9" presetID="1" presetClass="exit" presetSubtype="0" fill="hold" grpId="0" nodeType="clickEffect">
-                                  <p:stCondLst>
-                                    <p:cond delay="0"/>
-                                  </p:stCondLst>
-                                  <p:childTnLst>
-                                    <p:set>
-                                      <p:cBhvr>
-                                        <p:cTn id="10" dur="1" fill="hold">
-                                          <p:stCondLst>
-                                            <p:cond delay="0"/>
-                                          </p:stCondLst>
-                                        </p:cTn>
-                                        <p:tgtEl>
-                                          <p:spTgt spid="3"/>
-                                        </p:tgtEl>
-                                        <p:attrNameLst>
-                                          <p:attrName>style.visibility</p:attrName>
-                                        </p:attrNameLst>
-                                      </p:cBhvr>
-                                      <p:to>
-                                        <p:strVal val="hidden"/>
-                                      </p:to>
-                                    </p:set>
-                                  </p:childTnLst>
-                                </p:cTn>
-                              </p:par>
-                              <p:par>
-                                <p:cTn id="11" presetID="1" presetClass="entr" presetSubtype="0" fill="hold" grpId="0" nodeType="withEffect">
+                                <p:cTn id="11" presetID="1" presetClass="entr" presetSubtype="0" fill="hold" grpId="0" nodeType="clickEffect">
                                   <p:stCondLst>
                                     <p:cond delay="0"/>
                                   </p:stCondLst>
@@ -6171,7 +6399,7 @@
                                           </p:stCondLst>
                                         </p:cTn>
                                         <p:tgtEl>
-                                          <p:spTgt spid="11"/>
+                                          <p:spTgt spid="10"/>
                                         </p:tgtEl>
                                         <p:attrNameLst>
                                           <p:attrName>style.visibility</p:attrName>
@@ -6203,7 +6431,7 @@
                             </p:stCondLst>
                             <p:childTnLst>
                               <p:par>
-                                <p:cTn id="15" presetID="1" presetClass="entr" presetSubtype="0" fill="hold" grpId="0" nodeType="clickEffect">
+                                <p:cTn id="15" presetID="1" presetClass="exit" presetSubtype="0" fill="hold" grpId="0" nodeType="clickEffect">
                                   <p:stCondLst>
                                     <p:cond delay="0"/>
                                   </p:stCondLst>
@@ -6211,6 +6439,78 @@
                                     <p:set>
                                       <p:cBhvr>
                                         <p:cTn id="16" dur="1" fill="hold">
+                                          <p:stCondLst>
+                                            <p:cond delay="0"/>
+                                          </p:stCondLst>
+                                        </p:cTn>
+                                        <p:tgtEl>
+                                          <p:spTgt spid="3"/>
+                                        </p:tgtEl>
+                                        <p:attrNameLst>
+                                          <p:attrName>style.visibility</p:attrName>
+                                        </p:attrNameLst>
+                                      </p:cBhvr>
+                                      <p:to>
+                                        <p:strVal val="hidden"/>
+                                      </p:to>
+                                    </p:set>
+                                  </p:childTnLst>
+                                </p:cTn>
+                              </p:par>
+                              <p:par>
+                                <p:cTn id="17" presetID="1" presetClass="entr" presetSubtype="0" fill="hold" grpId="0" nodeType="withEffect">
+                                  <p:stCondLst>
+                                    <p:cond delay="0"/>
+                                  </p:stCondLst>
+                                  <p:childTnLst>
+                                    <p:set>
+                                      <p:cBhvr>
+                                        <p:cTn id="18" dur="1" fill="hold">
+                                          <p:stCondLst>
+                                            <p:cond delay="0"/>
+                                          </p:stCondLst>
+                                        </p:cTn>
+                                        <p:tgtEl>
+                                          <p:spTgt spid="11"/>
+                                        </p:tgtEl>
+                                        <p:attrNameLst>
+                                          <p:attrName>style.visibility</p:attrName>
+                                        </p:attrNameLst>
+                                      </p:cBhvr>
+                                      <p:to>
+                                        <p:strVal val="visible"/>
+                                      </p:to>
+                                    </p:set>
+                                  </p:childTnLst>
+                                </p:cTn>
+                              </p:par>
+                            </p:childTnLst>
+                          </p:cTn>
+                        </p:par>
+                      </p:childTnLst>
+                    </p:cTn>
+                  </p:par>
+                  <p:par>
+                    <p:cTn id="19" fill="hold">
+                      <p:stCondLst>
+                        <p:cond delay="indefinite"/>
+                      </p:stCondLst>
+                      <p:childTnLst>
+                        <p:par>
+                          <p:cTn id="20" fill="hold">
+                            <p:stCondLst>
+                              <p:cond delay="0"/>
+                            </p:stCondLst>
+                            <p:childTnLst>
+                              <p:par>
+                                <p:cTn id="21" presetID="1" presetClass="entr" presetSubtype="0" fill="hold" grpId="0" nodeType="clickEffect">
+                                  <p:stCondLst>
+                                    <p:cond delay="0"/>
+                                  </p:stCondLst>
+                                  <p:childTnLst>
+                                    <p:set>
+                                      <p:cBhvr>
+                                        <p:cTn id="22" dur="1" fill="hold">
                                           <p:stCondLst>
                                             <p:cond delay="0"/>
                                           </p:stCondLst>
@@ -6236,26 +6536,26 @@
                     </p:cTn>
                   </p:par>
                   <p:par>
-                    <p:cTn id="17" fill="hold">
+                    <p:cTn id="23" fill="hold">
                       <p:stCondLst>
                         <p:cond delay="indefinite"/>
                       </p:stCondLst>
                       <p:childTnLst>
                         <p:par>
-                          <p:cTn id="18" fill="hold">
+                          <p:cTn id="24" fill="hold">
                             <p:stCondLst>
                               <p:cond delay="0"/>
                             </p:stCondLst>
                             <p:childTnLst>
                               <p:par>
-                                <p:cTn id="19" presetID="1" presetClass="entr" presetSubtype="0" fill="hold" nodeType="clickEffect">
+                                <p:cTn id="25" presetID="1" presetClass="entr" presetSubtype="0" fill="hold" nodeType="clickEffect">
                                   <p:stCondLst>
                                     <p:cond delay="0"/>
                                   </p:stCondLst>
                                   <p:childTnLst>
                                     <p:set>
                                       <p:cBhvr>
-                                        <p:cTn id="20" dur="1" fill="hold">
+                                        <p:cTn id="26" dur="1" fill="hold">
                                           <p:stCondLst>
                                             <p:cond delay="0"/>
                                           </p:stCondLst>
@@ -6275,14 +6575,14 @@
                                 </p:cTn>
                               </p:par>
                               <p:par>
-                                <p:cTn id="21" presetID="1" presetClass="exit" presetSubtype="0" fill="hold" grpId="1" nodeType="withEffect">
+                                <p:cTn id="27" presetID="1" presetClass="exit" presetSubtype="0" fill="hold" grpId="1" nodeType="withEffect">
                                   <p:stCondLst>
                                     <p:cond delay="0"/>
                                   </p:stCondLst>
                                   <p:childTnLst>
                                     <p:set>
                                       <p:cBhvr>
-                                        <p:cTn id="22" dur="1" fill="hold">
+                                        <p:cTn id="28" dur="1" fill="hold">
                                           <p:stCondLst>
                                             <p:cond delay="0"/>
                                           </p:stCondLst>
@@ -6302,14 +6602,14 @@
                                 </p:cTn>
                               </p:par>
                               <p:par>
-                                <p:cTn id="23" presetID="1" presetClass="exit" presetSubtype="0" fill="hold" grpId="1" nodeType="withEffect">
+                                <p:cTn id="29" presetID="1" presetClass="exit" presetSubtype="0" fill="hold" grpId="1" nodeType="withEffect">
                                   <p:stCondLst>
                                     <p:cond delay="0"/>
                                   </p:stCondLst>
                                   <p:childTnLst>
                                     <p:set>
                                       <p:cBhvr>
-                                        <p:cTn id="24" dur="1" fill="hold">
+                                        <p:cTn id="30" dur="1" fill="hold">
                                           <p:stCondLst>
                                             <p:cond delay="0"/>
                                           </p:stCondLst>
@@ -6329,14 +6629,14 @@
                                 </p:cTn>
                               </p:par>
                               <p:par>
-                                <p:cTn id="25" presetID="1" presetClass="entr" presetSubtype="0" fill="hold" grpId="0" nodeType="withEffect">
+                                <p:cTn id="31" presetID="1" presetClass="entr" presetSubtype="0" fill="hold" grpId="0" nodeType="withEffect">
                                   <p:stCondLst>
                                     <p:cond delay="0"/>
                                   </p:stCondLst>
                                   <p:childTnLst>
                                     <p:set>
                                       <p:cBhvr>
-                                        <p:cTn id="26" dur="1" fill="hold">
+                                        <p:cTn id="32" dur="1" fill="hold">
                                           <p:stCondLst>
                                             <p:cond delay="0"/>
                                           </p:stCondLst>
@@ -6356,14 +6656,14 @@
                                 </p:cTn>
                               </p:par>
                               <p:par>
-                                <p:cTn id="27" presetID="1" presetClass="entr" presetSubtype="0" fill="hold" grpId="0" nodeType="withEffect">
+                                <p:cTn id="33" presetID="1" presetClass="entr" presetSubtype="0" fill="hold" grpId="0" nodeType="withEffect">
                                   <p:stCondLst>
                                     <p:cond delay="0"/>
                                   </p:stCondLst>
                                   <p:childTnLst>
                                     <p:set>
                                       <p:cBhvr>
-                                        <p:cTn id="28" dur="1" fill="hold">
+                                        <p:cTn id="34" dur="1" fill="hold">
                                           <p:stCondLst>
                                             <p:cond delay="0"/>
                                           </p:stCondLst>
@@ -6411,6 +6711,7 @@
     </p:tnLst>
     <p:bldLst>
       <p:bldP spid="3" grpId="0"/>
+      <p:bldP spid="3" grpId="1"/>
       <p:bldP spid="10" grpId="0"/>
       <p:bldP spid="10" grpId="1"/>
       <p:bldP spid="11" grpId="0"/>

</xml_diff>